<commit_message>
Added PBL presentation file
</commit_message>
<xml_diff>
--- a/PriceScout_PBL_Presentation.pptx
+++ b/PriceScout_PBL_Presentation.pptx
@@ -3412,11 +3412,13 @@
         <p:spPr>
           <a:xfrm>
             <a:off x="1077411" y="4890977"/>
-            <a:ext cx="3239387" cy="1222744"/>
+            <a:ext cx="3907544" cy="1222744"/>
           </a:xfrm>
         </p:spPr>
         <p:txBody>
-          <a:bodyPr/>
+          <a:bodyPr>
+            <a:normAutofit/>
+          </a:bodyPr>
           <a:lstStyle/>
           <a:p>
             <a:r>
@@ -3427,15 +3429,18 @@
               <a:rPr lang="en-IN" dirty="0"/>
             </a:br>
             <a:r>
-              <a:rPr lang="en-IN" dirty="0"/>
-              <a:t>Devanshu Sharma</a:t>
-            </a:r>
-          </a:p>
-          <a:p>
-            <a:r>
-              <a:rPr lang="en-IN" dirty="0"/>
-              <a:t>23FE10CSE00274</a:t>
-            </a:r>
+              <a:rPr lang="en-IN" sz="1700" dirty="0"/>
+              <a:t>Devanshu Sharma - 23FE10CSE00274</a:t>
+            </a:r>
+          </a:p>
+          <a:p>
+            <a:r>
+              <a:rPr lang="en-IN" sz="1700" dirty="0"/>
+              <a:t>Sudhanshu Mishra – 23FE10CSE00187</a:t>
+            </a:r>
+          </a:p>
+          <a:p>
+            <a:endParaRPr lang="en-IN" dirty="0"/>
           </a:p>
         </p:txBody>
       </p:sp>

</xml_diff>